<commit_message>
Fix a typo in the COR pattern
</commit_message>
<xml_diff>
--- a/Lesson.04 - Design Patterns - Behavioral/Behavioral.pptx
+++ b/Lesson.04 - Design Patterns - Behavioral/Behavioral.pptx
@@ -256,7 +256,7 @@
           <a:p>
             <a:fld id="{14042657-6240-B14B-9F48-F865CB79AC7C}" type="datetimeFigureOut">
               <a:rPr lang="en-US" smtClean="0"/>
-              <a:t>10/25/25</a:t>
+              <a:t>10/27/25</a:t>
             </a:fld>
             <a:endParaRPr lang="en-US"/>
           </a:p>
@@ -440,7 +440,7 @@
           <a:p>
             <a:fld id="{5E6B121A-761B-2742-9D61-65348EACD743}" type="datetimeFigureOut">
               <a:rPr lang="en-US" smtClean="0"/>
-              <a:t>10/25/25</a:t>
+              <a:t>10/27/25</a:t>
             </a:fld>
             <a:endParaRPr lang="en-US"/>
           </a:p>
@@ -1769,7 +1769,7 @@
           <a:lstStyle/>
           <a:p>
             <a:fld id="{9BD34D52-BB7C-854D-9DDA-219ECD962971}" type="datetime1">
-              <a:t>10/25/25</a:t>
+              <a:t>10/27/25</a:t>
             </a:fld>
             <a:endParaRPr lang="en-US"/>
           </a:p>
@@ -1969,7 +1969,7 @@
           <a:lstStyle/>
           <a:p>
             <a:fld id="{2C93C82A-D64A-BB47-AD23-7FDE1167F9F4}" type="datetime1">
-              <a:t>10/25/25</a:t>
+              <a:t>10/27/25</a:t>
             </a:fld>
             <a:endParaRPr lang="en-US"/>
           </a:p>
@@ -2179,7 +2179,7 @@
           <a:lstStyle/>
           <a:p>
             <a:fld id="{A64E5B65-54AD-4049-AA67-F2EC50F175FC}" type="datetime1">
-              <a:t>10/25/25</a:t>
+              <a:t>10/27/25</a:t>
             </a:fld>
             <a:endParaRPr lang="en-US"/>
           </a:p>
@@ -2379,7 +2379,7 @@
           <a:lstStyle/>
           <a:p>
             <a:fld id="{7FA6C751-7D74-8246-AAFC-FC27C7D08394}" type="datetime1">
-              <a:t>10/25/25</a:t>
+              <a:t>10/27/25</a:t>
             </a:fld>
             <a:endParaRPr lang="en-US"/>
           </a:p>
@@ -2656,7 +2656,7 @@
           <a:lstStyle/>
           <a:p>
             <a:fld id="{54490DBE-5324-584D-AECD-4D4878479924}" type="datetime1">
-              <a:t>10/25/25</a:t>
+              <a:t>10/27/25</a:t>
             </a:fld>
             <a:endParaRPr lang="en-US"/>
           </a:p>
@@ -2923,7 +2923,7 @@
           <a:lstStyle/>
           <a:p>
             <a:fld id="{A1C7998A-C6AB-E847-BCE7-2CE4822460A0}" type="datetime1">
-              <a:t>10/25/25</a:t>
+              <a:t>10/27/25</a:t>
             </a:fld>
             <a:endParaRPr lang="en-US"/>
           </a:p>
@@ -3337,7 +3337,7 @@
           <a:lstStyle/>
           <a:p>
             <a:fld id="{1A029828-DE3C-6344-9A6C-28FC03A641AE}" type="datetime1">
-              <a:t>10/25/25</a:t>
+              <a:t>10/27/25</a:t>
             </a:fld>
             <a:endParaRPr lang="en-US"/>
           </a:p>
@@ -3480,7 +3480,7 @@
           <a:lstStyle/>
           <a:p>
             <a:fld id="{CFCC8BED-CE8B-B442-8698-B57B46200BC4}" type="datetime1">
-              <a:t>10/25/25</a:t>
+              <a:t>10/27/25</a:t>
             </a:fld>
             <a:endParaRPr lang="en-US"/>
           </a:p>
@@ -3595,7 +3595,7 @@
           <a:lstStyle/>
           <a:p>
             <a:fld id="{60826904-1542-6D46-A11E-71888A785E6A}" type="datetime1">
-              <a:t>10/25/25</a:t>
+              <a:t>10/27/25</a:t>
             </a:fld>
             <a:endParaRPr lang="en-US"/>
           </a:p>
@@ -3908,7 +3908,7 @@
           <a:lstStyle/>
           <a:p>
             <a:fld id="{5DD2CD17-60F3-454C-A851-1DF314985B16}" type="datetime1">
-              <a:t>10/25/25</a:t>
+              <a:t>10/27/25</a:t>
             </a:fld>
             <a:endParaRPr lang="en-US"/>
           </a:p>
@@ -4198,7 +4198,7 @@
           <a:lstStyle/>
           <a:p>
             <a:fld id="{F27491F6-F2F1-7D41-B8B9-926E6C940F9D}" type="datetime1">
-              <a:t>10/25/25</a:t>
+              <a:t>10/27/25</a:t>
             </a:fld>
             <a:endParaRPr lang="en-US"/>
           </a:p>
@@ -4441,7 +4441,7 @@
           </a:lstStyle>
           <a:p>
             <a:fld id="{0D4408EE-EB51-5B4F-B540-CE9062C80698}" type="datetime1">
-              <a:t>10/25/25</a:t>
+              <a:t>10/27/25</a:t>
             </a:fld>
             <a:endParaRPr lang="en-US"/>
           </a:p>
@@ -8862,6 +8862,51 @@
                       </p:childTnLst>
                     </p:cTn>
                   </p:par>
+                  <p:par>
+                    <p:cTn id="27" fill="hold">
+                      <p:stCondLst>
+                        <p:cond delay="indefinite"/>
+                      </p:stCondLst>
+                      <p:childTnLst>
+                        <p:par>
+                          <p:cTn id="28" fill="hold">
+                            <p:stCondLst>
+                              <p:cond delay="0"/>
+                            </p:stCondLst>
+                            <p:childTnLst>
+                              <p:par>
+                                <p:cTn id="29" presetID="1" presetClass="entr" presetSubtype="0" fill="hold" grpId="0" nodeType="clickEffect">
+                                  <p:stCondLst>
+                                    <p:cond delay="0"/>
+                                  </p:stCondLst>
+                                  <p:childTnLst>
+                                    <p:set>
+                                      <p:cBhvr>
+                                        <p:cTn id="30" dur="1" fill="hold">
+                                          <p:stCondLst>
+                                            <p:cond delay="0"/>
+                                          </p:stCondLst>
+                                        </p:cTn>
+                                        <p:tgtEl>
+                                          <p:spTgt spid="5"/>
+                                        </p:tgtEl>
+                                        <p:attrNameLst>
+                                          <p:attrName>style.visibility</p:attrName>
+                                        </p:attrNameLst>
+                                      </p:cBhvr>
+                                      <p:to>
+                                        <p:strVal val="visible"/>
+                                      </p:to>
+                                    </p:set>
+                                  </p:childTnLst>
+                                </p:cTn>
+                              </p:par>
+                            </p:childTnLst>
+                          </p:cTn>
+                        </p:par>
+                      </p:childTnLst>
+                    </p:cTn>
+                  </p:par>
                 </p:childTnLst>
               </p:cTn>
               <p:prevCondLst>
@@ -8889,6 +8934,7 @@
       <p:bldP spid="7" grpId="0" animBg="1"/>
       <p:bldP spid="4" grpId="0" animBg="1"/>
       <p:bldP spid="11" grpId="0" animBg="1"/>
+      <p:bldP spid="5" grpId="0"/>
     </p:bldLst>
   </p:timing>
 </p:sld>
@@ -25430,7 +25476,7 @@
                 <a:latin typeface="Courier New" panose="02070309020205020404" pitchFamily="49" charset="0"/>
                 <a:cs typeface="Courier New" panose="02070309020205020404" pitchFamily="49" charset="0"/>
               </a:rPr>
-              <a:t>  public ObjectCompiler</a:t>
+              <a:t>  public ObjComp</a:t>
             </a:r>
           </a:p>
           <a:p>
@@ -25902,7 +25948,7 @@
                 <a:latin typeface="Courier New" panose="02070309020205020404" pitchFamily="49" charset="0"/>
                 <a:cs typeface="Courier New" panose="02070309020205020404" pitchFamily="49" charset="0"/>
               </a:rPr>
-              <a:t>  public ObjectCompiler</a:t>
+              <a:t>  public ObjComp</a:t>
             </a:r>
           </a:p>
           <a:p>
@@ -26063,7 +26109,7 @@
         <p:spPr>
           <a:xfrm>
             <a:off x="8149899" y="2090939"/>
-            <a:ext cx="3954929" cy="1323439"/>
+            <a:ext cx="3416320" cy="1323439"/>
           </a:xfrm>
           <a:prstGeom prst="rect">
             <a:avLst/>
@@ -26081,7 +26127,7 @@
                 <a:latin typeface="Courier New" panose="02070309020205020404" pitchFamily="49" charset="0"/>
                 <a:cs typeface="Courier New" panose="02070309020205020404" pitchFamily="49" charset="0"/>
               </a:rPr>
-              <a:t>class LocalObjectCompiler : public ObjectCompiler</a:t>
+              <a:t>class LocalObjectCompiler : public ObjComp</a:t>
             </a:r>
           </a:p>
           <a:p>
@@ -26570,7 +26616,7 @@
                             </p:stCondLst>
                             <p:childTnLst>
                               <p:par>
-                                <p:cTn id="17" presetID="1" presetClass="entr" presetSubtype="0" fill="hold" grpId="0" nodeType="clickEffect">
+                                <p:cTn id="17" presetID="1" presetClass="entr" presetSubtype="0" fill="hold" nodeType="clickEffect">
                                   <p:stCondLst>
                                     <p:cond delay="0"/>
                                   </p:stCondLst>
@@ -26578,6 +26624,33 @@
                                     <p:set>
                                       <p:cBhvr>
                                         <p:cTn id="18" dur="1" fill="hold">
+                                          <p:stCondLst>
+                                            <p:cond delay="0"/>
+                                          </p:stCondLst>
+                                        </p:cTn>
+                                        <p:tgtEl>
+                                          <p:spTgt spid="20"/>
+                                        </p:tgtEl>
+                                        <p:attrNameLst>
+                                          <p:attrName>style.visibility</p:attrName>
+                                        </p:attrNameLst>
+                                      </p:cBhvr>
+                                      <p:to>
+                                        <p:strVal val="visible"/>
+                                      </p:to>
+                                    </p:set>
+                                  </p:childTnLst>
+                                </p:cTn>
+                              </p:par>
+                              <p:par>
+                                <p:cTn id="19" presetID="1" presetClass="entr" presetSubtype="0" fill="hold" grpId="0" nodeType="withEffect">
+                                  <p:stCondLst>
+                                    <p:cond delay="0"/>
+                                  </p:stCondLst>
+                                  <p:childTnLst>
+                                    <p:set>
+                                      <p:cBhvr>
+                                        <p:cTn id="20" dur="1" fill="hold">
                                           <p:stCondLst>
                                             <p:cond delay="0"/>
                                           </p:stCondLst>
@@ -26603,26 +26676,53 @@
                     </p:cTn>
                   </p:par>
                   <p:par>
-                    <p:cTn id="19" fill="hold">
+                    <p:cTn id="21" fill="hold">
                       <p:stCondLst>
                         <p:cond delay="indefinite"/>
                       </p:stCondLst>
                       <p:childTnLst>
                         <p:par>
-                          <p:cTn id="20" fill="hold">
+                          <p:cTn id="22" fill="hold">
                             <p:stCondLst>
                               <p:cond delay="0"/>
                             </p:stCondLst>
                             <p:childTnLst>
                               <p:par>
-                                <p:cTn id="21" presetID="1" presetClass="entr" presetSubtype="0" fill="hold" grpId="0" nodeType="clickEffect">
+                                <p:cTn id="23" presetID="1" presetClass="entr" presetSubtype="0" fill="hold" nodeType="clickEffect">
                                   <p:stCondLst>
                                     <p:cond delay="0"/>
                                   </p:stCondLst>
                                   <p:childTnLst>
                                     <p:set>
                                       <p:cBhvr>
-                                        <p:cTn id="22" dur="1" fill="hold">
+                                        <p:cTn id="24" dur="1" fill="hold">
+                                          <p:stCondLst>
+                                            <p:cond delay="0"/>
+                                          </p:stCondLst>
+                                        </p:cTn>
+                                        <p:tgtEl>
+                                          <p:spTgt spid="16"/>
+                                        </p:tgtEl>
+                                        <p:attrNameLst>
+                                          <p:attrName>style.visibility</p:attrName>
+                                        </p:attrNameLst>
+                                      </p:cBhvr>
+                                      <p:to>
+                                        <p:strVal val="visible"/>
+                                      </p:to>
+                                    </p:set>
+                                  </p:childTnLst>
+                                </p:cTn>
+                              </p:par>
+                              <p:par>
+                                <p:cTn id="25" presetID="1" presetClass="entr" presetSubtype="0" fill="hold" grpId="0" nodeType="withEffect">
+                                  <p:stCondLst>
+                                    <p:cond delay="0"/>
+                                  </p:stCondLst>
+                                  <p:childTnLst>
+                                    <p:set>
+                                      <p:cBhvr>
+                                        <p:cTn id="26" dur="1" fill="hold">
                                           <p:stCondLst>
                                             <p:cond delay="0"/>
                                           </p:stCondLst>
@@ -26648,26 +26748,26 @@
                     </p:cTn>
                   </p:par>
                   <p:par>
-                    <p:cTn id="23" fill="hold">
+                    <p:cTn id="27" fill="hold">
                       <p:stCondLst>
                         <p:cond delay="indefinite"/>
                       </p:stCondLst>
                       <p:childTnLst>
                         <p:par>
-                          <p:cTn id="24" fill="hold">
+                          <p:cTn id="28" fill="hold">
                             <p:stCondLst>
                               <p:cond delay="0"/>
                             </p:stCondLst>
                             <p:childTnLst>
                               <p:par>
-                                <p:cTn id="25" presetID="1" presetClass="entr" presetSubtype="0" fill="hold" grpId="0" nodeType="clickEffect">
+                                <p:cTn id="29" presetID="1" presetClass="entr" presetSubtype="0" fill="hold" grpId="0" nodeType="clickEffect">
                                   <p:stCondLst>
                                     <p:cond delay="0"/>
                                   </p:stCondLst>
                                   <p:childTnLst>
                                     <p:set>
                                       <p:cBhvr>
-                                        <p:cTn id="26" dur="1" fill="hold">
+                                        <p:cTn id="30" dur="1" fill="hold">
                                           <p:stCondLst>
                                             <p:cond delay="0"/>
                                           </p:stCondLst>
@@ -32765,4 +32865,10 @@
     </a:ext>
   </a:extLst>
 </a:theme>
+</file>
+
+<file path=docMetadata/LabelInfo.xml><?xml version="1.0" encoding="utf-8"?>
+<clbl:labelList xmlns:clbl="http://schemas.microsoft.com/office/2020/mipLabelMetadata">
+  <clbl:label id="{0cf7ac0a-4681-4823-ab0b-04ef02c5f873}" enabled="1" method="Standard" siteId="{42f7676c-f455-423c-82f6-dc2d99791af7}" contentBits="0" removed="0"/>
+</clbl:labelList>
 </file>
</xml_diff>

<commit_message>
Fix typo in Behavioral PPT and add a Visitor vs. Plain comparison
</commit_message>
<xml_diff>
--- a/Lesson.04 - Design Patterns - Behavioral/Behavioral.pptx
+++ b/Lesson.04 - Design Patterns - Behavioral/Behavioral.pptx
@@ -256,7 +256,7 @@
           <a:p>
             <a:fld id="{14042657-6240-B14B-9F48-F865CB79AC7C}" type="datetimeFigureOut">
               <a:rPr lang="en-US" smtClean="0"/>
-              <a:t>10/27/25</a:t>
+              <a:t>10/29/25</a:t>
             </a:fld>
             <a:endParaRPr lang="en-US"/>
           </a:p>
@@ -440,7 +440,7 @@
           <a:p>
             <a:fld id="{5E6B121A-761B-2742-9D61-65348EACD743}" type="datetimeFigureOut">
               <a:rPr lang="en-US" smtClean="0"/>
-              <a:t>10/27/25</a:t>
+              <a:t>10/29/25</a:t>
             </a:fld>
             <a:endParaRPr lang="en-US"/>
           </a:p>
@@ -1769,7 +1769,7 @@
           <a:lstStyle/>
           <a:p>
             <a:fld id="{9BD34D52-BB7C-854D-9DDA-219ECD962971}" type="datetime1">
-              <a:t>10/27/25</a:t>
+              <a:t>10/29/25</a:t>
             </a:fld>
             <a:endParaRPr lang="en-US"/>
           </a:p>
@@ -1969,7 +1969,7 @@
           <a:lstStyle/>
           <a:p>
             <a:fld id="{2C93C82A-D64A-BB47-AD23-7FDE1167F9F4}" type="datetime1">
-              <a:t>10/27/25</a:t>
+              <a:t>10/29/25</a:t>
             </a:fld>
             <a:endParaRPr lang="en-US"/>
           </a:p>
@@ -2179,7 +2179,7 @@
           <a:lstStyle/>
           <a:p>
             <a:fld id="{A64E5B65-54AD-4049-AA67-F2EC50F175FC}" type="datetime1">
-              <a:t>10/27/25</a:t>
+              <a:t>10/29/25</a:t>
             </a:fld>
             <a:endParaRPr lang="en-US"/>
           </a:p>
@@ -2379,7 +2379,7 @@
           <a:lstStyle/>
           <a:p>
             <a:fld id="{7FA6C751-7D74-8246-AAFC-FC27C7D08394}" type="datetime1">
-              <a:t>10/27/25</a:t>
+              <a:t>10/29/25</a:t>
             </a:fld>
             <a:endParaRPr lang="en-US"/>
           </a:p>
@@ -2656,7 +2656,7 @@
           <a:lstStyle/>
           <a:p>
             <a:fld id="{54490DBE-5324-584D-AECD-4D4878479924}" type="datetime1">
-              <a:t>10/27/25</a:t>
+              <a:t>10/29/25</a:t>
             </a:fld>
             <a:endParaRPr lang="en-US"/>
           </a:p>
@@ -2923,7 +2923,7 @@
           <a:lstStyle/>
           <a:p>
             <a:fld id="{A1C7998A-C6AB-E847-BCE7-2CE4822460A0}" type="datetime1">
-              <a:t>10/27/25</a:t>
+              <a:t>10/29/25</a:t>
             </a:fld>
             <a:endParaRPr lang="en-US"/>
           </a:p>
@@ -3337,7 +3337,7 @@
           <a:lstStyle/>
           <a:p>
             <a:fld id="{1A029828-DE3C-6344-9A6C-28FC03A641AE}" type="datetime1">
-              <a:t>10/27/25</a:t>
+              <a:t>10/29/25</a:t>
             </a:fld>
             <a:endParaRPr lang="en-US"/>
           </a:p>
@@ -3480,7 +3480,7 @@
           <a:lstStyle/>
           <a:p>
             <a:fld id="{CFCC8BED-CE8B-B442-8698-B57B46200BC4}" type="datetime1">
-              <a:t>10/27/25</a:t>
+              <a:t>10/29/25</a:t>
             </a:fld>
             <a:endParaRPr lang="en-US"/>
           </a:p>
@@ -3595,7 +3595,7 @@
           <a:lstStyle/>
           <a:p>
             <a:fld id="{60826904-1542-6D46-A11E-71888A785E6A}" type="datetime1">
-              <a:t>10/27/25</a:t>
+              <a:t>10/29/25</a:t>
             </a:fld>
             <a:endParaRPr lang="en-US"/>
           </a:p>
@@ -3908,7 +3908,7 @@
           <a:lstStyle/>
           <a:p>
             <a:fld id="{5DD2CD17-60F3-454C-A851-1DF314985B16}" type="datetime1">
-              <a:t>10/27/25</a:t>
+              <a:t>10/29/25</a:t>
             </a:fld>
             <a:endParaRPr lang="en-US"/>
           </a:p>
@@ -4198,7 +4198,7 @@
           <a:lstStyle/>
           <a:p>
             <a:fld id="{F27491F6-F2F1-7D41-B8B9-926E6C940F9D}" type="datetime1">
-              <a:t>10/27/25</a:t>
+              <a:t>10/29/25</a:t>
             </a:fld>
             <a:endParaRPr lang="en-US"/>
           </a:p>
@@ -4441,7 +4441,7 @@
           </a:lstStyle>
           <a:p>
             <a:fld id="{0D4408EE-EB51-5B4F-B540-CE9062C80698}" type="datetime1">
-              <a:t>10/27/25</a:t>
+              <a:t>10/29/25</a:t>
             </a:fld>
             <a:endParaRPr lang="en-US"/>
           </a:p>
@@ -9907,7 +9907,7 @@
         <p:spPr>
           <a:xfrm>
             <a:off x="1257419" y="819786"/>
-            <a:ext cx="2601994" cy="1015663"/>
+            <a:ext cx="2880917" cy="1015663"/>
           </a:xfrm>
           <a:prstGeom prst="rect">
             <a:avLst/>
@@ -9948,16 +9948,16 @@
                 <a:latin typeface="Courier New" panose="02070309020205020404" pitchFamily="49" charset="0"/>
                 <a:cs typeface="Courier New" panose="02070309020205020404" pitchFamily="49" charset="0"/>
               </a:rPr>
-              <a:t>  virtual void execute();</a:t>
-            </a:r>
-          </a:p>
-          <a:p>
-            <a:r>
-              <a:rPr lang="en-US" sz="1200" dirty="0">
-                <a:latin typeface="Courier New" panose="02070309020205020404" pitchFamily="49" charset="0"/>
-                <a:cs typeface="Courier New" panose="02070309020205020404" pitchFamily="49" charset="0"/>
-              </a:rPr>
-              <a:t>  virtual void undo();</a:t>
+              <a:t>  virtual void execute() = 0;</a:t>
+            </a:r>
+          </a:p>
+          <a:p>
+            <a:r>
+              <a:rPr lang="en-US" sz="1200" dirty="0">
+                <a:latin typeface="Courier New" panose="02070309020205020404" pitchFamily="49" charset="0"/>
+                <a:cs typeface="Courier New" panose="02070309020205020404" pitchFamily="49" charset="0"/>
+              </a:rPr>
+              <a:t>  virtual void undo() = 0;</a:t>
             </a:r>
           </a:p>
           <a:p>
@@ -10632,8 +10632,8 @@
           </p:nvCxnSpPr>
           <p:spPr>
             <a:xfrm rot="5400000" flipH="1" flipV="1">
-              <a:off x="1483380" y="1788252"/>
-              <a:ext cx="1027839" cy="1122234"/>
+              <a:off x="1553111" y="1718521"/>
+              <a:ext cx="1027839" cy="1261696"/>
             </a:xfrm>
             <a:prstGeom prst="bentConnector3">
               <a:avLst/>
@@ -10675,8 +10675,8 @@
           </p:nvCxnSpPr>
           <p:spPr>
             <a:xfrm rot="16200000" flipV="1">
-              <a:off x="2694996" y="1698870"/>
-              <a:ext cx="1027839" cy="1300997"/>
+              <a:off x="2764727" y="1768601"/>
+              <a:ext cx="1027839" cy="1161535"/>
             </a:xfrm>
             <a:prstGeom prst="bentConnector3">
               <a:avLst>
@@ -10721,8 +10721,8 @@
         </p:nvCxnSpPr>
         <p:spPr>
           <a:xfrm rot="10800000">
-            <a:off x="3859413" y="1327618"/>
-            <a:ext cx="1364632" cy="1153390"/>
+            <a:off x="4138337" y="1327618"/>
+            <a:ext cx="1085709" cy="1153390"/>
           </a:xfrm>
           <a:prstGeom prst="bentConnector3">
             <a:avLst>

</xml_diff>